<commit_message>
Updated kalman and general presentation. Kalman data already included in main presentation
</commit_message>
<xml_diff>
--- a/robprak1516-presentation-kalman.pptx
+++ b/robprak1516-presentation-kalman.pptx
@@ -4486,11 +4486,6 @@
               </a:rPr>
               <a:t>Custom Kalman</a:t>
             </a:r>
-            <a:endParaRPr kumimoji="1" lang="de-DE" sz="1400" dirty="0">
-              <a:latin typeface="Verdana" pitchFamily="34" charset="0"/>
-              <a:ea typeface="ヒラギノ角ゴ Pro W3"/>
-              <a:cs typeface="ヒラギノ角ゴ Pro W3"/>
-            </a:endParaRPr>
           </a:p>
         </p:txBody>
       </p:sp>
@@ -4549,14 +4544,6 @@
               </a:rPr>
               <a:t>Roboter / Kartendienst starten</a:t>
             </a:r>
-            <a:endParaRPr kumimoji="1" lang="de-DE" sz="1400" dirty="0">
-              <a:solidFill>
-                <a:schemeClr val="bg1"/>
-              </a:solidFill>
-              <a:latin typeface="Verdana" pitchFamily="34" charset="0"/>
-              <a:ea typeface="ヒラギノ角ゴ Pro W3"/>
-              <a:cs typeface="ヒラギノ角ゴ Pro W3"/>
-            </a:endParaRPr>
           </a:p>
         </p:txBody>
       </p:sp>
@@ -6266,11 +6253,6 @@
               </a:rPr>
               <a:t>Custom Kalman</a:t>
             </a:r>
-            <a:endParaRPr kumimoji="1" lang="de-DE" sz="1400" dirty="0">
-              <a:latin typeface="Verdana" pitchFamily="34" charset="0"/>
-              <a:ea typeface="ヒラギノ角ゴ Pro W3"/>
-              <a:cs typeface="ヒラギノ角ゴ Pro W3"/>
-            </a:endParaRPr>
           </a:p>
         </p:txBody>
       </p:sp>
@@ -8411,11 +8393,6 @@
               </a:rPr>
               <a:t>Custom Kalman</a:t>
             </a:r>
-            <a:endParaRPr kumimoji="1" lang="de-DE" sz="1400" dirty="0">
-              <a:latin typeface="Verdana" pitchFamily="34" charset="0"/>
-              <a:ea typeface="ヒラギノ角ゴ Pro W3"/>
-              <a:cs typeface="ヒラギノ角ゴ Pro W3"/>
-            </a:endParaRPr>
           </a:p>
         </p:txBody>
       </p:sp>
@@ -8474,14 +8451,6 @@
               </a:rPr>
               <a:t>ROS Kommunikation hinter NAT</a:t>
             </a:r>
-            <a:endParaRPr kumimoji="1" lang="de-DE" sz="1400" dirty="0">
-              <a:solidFill>
-                <a:schemeClr val="bg1"/>
-              </a:solidFill>
-              <a:latin typeface="Verdana" pitchFamily="34" charset="0"/>
-              <a:ea typeface="ヒラギノ角ゴ Pro W3"/>
-              <a:cs typeface="ヒラギノ角ゴ Pro W3"/>
-            </a:endParaRPr>
           </a:p>
         </p:txBody>
       </p:sp>
@@ -10896,14 +10865,6 @@
               </a:rPr>
               <a:t>Fehlinterpretiertes Verhalten</a:t>
             </a:r>
-            <a:endParaRPr kumimoji="1" lang="de-DE" sz="1400" dirty="0">
-              <a:solidFill>
-                <a:schemeClr val="bg1"/>
-              </a:solidFill>
-              <a:latin typeface="Verdana" pitchFamily="34" charset="0"/>
-              <a:ea typeface="ヒラギノ角ゴ Pro W3"/>
-              <a:cs typeface="ヒラギノ角ゴ Pro W3"/>
-            </a:endParaRPr>
           </a:p>
         </p:txBody>
       </p:sp>
@@ -10955,11 +10916,6 @@
               </a:rPr>
               <a:t>Custom Kalman</a:t>
             </a:r>
-            <a:endParaRPr kumimoji="1" lang="de-DE" sz="1400" dirty="0">
-              <a:latin typeface="Verdana" pitchFamily="34" charset="0"/>
-              <a:ea typeface="ヒラギノ角ゴ Pro W3"/>
-              <a:cs typeface="ヒラギノ角ゴ Pro W3"/>
-            </a:endParaRPr>
           </a:p>
         </p:txBody>
       </p:sp>
@@ -18965,18 +18921,7 @@
                 <a:ea typeface="ヒラギノ角ゴ Pro W3" charset="-128"/>
                 <a:cs typeface="+mn-cs"/>
               </a:rPr>
-              <a:t> </a:t>
-            </a:r>
-            <a:r>
-              <a:rPr lang="de-DE" sz="1400" dirty="0" smtClean="0">
-                <a:solidFill>
-                  <a:schemeClr val="bg1"/>
-                </a:solidFill>
-                <a:latin typeface="Arial" charset="0"/>
-                <a:ea typeface="ヒラギノ角ゴ Pro W3" charset="-128"/>
-                <a:cs typeface="+mn-cs"/>
-              </a:rPr>
-              <a:t>Simulator</a:t>
+              <a:t> Simulator</a:t>
             </a:r>
             <a:endParaRPr lang="de-DE" sz="1400" b="1" dirty="0">
               <a:solidFill>
@@ -21051,7 +20996,7 @@
         <p:spPr bwMode="auto">
           <a:xfrm>
             <a:off x="4954587" y="4123192"/>
-            <a:ext cx="2019935" cy="1911848"/>
+            <a:ext cx="2019935" cy="2119112"/>
           </a:xfrm>
           <a:prstGeom prst="rect">
             <a:avLst/>
@@ -21224,7 +21169,6 @@
               <a:rPr lang="de-DE" dirty="0"/>
               <a:t>Zu große Varianzen gewählt</a:t>
             </a:r>
-            <a:endParaRPr lang="de-DE" dirty="0"/>
           </a:p>
         </p:txBody>
       </p:sp>
@@ -21239,7 +21183,7 @@
         <p:spPr bwMode="auto">
           <a:xfrm>
             <a:off x="2782887" y="4123192"/>
-            <a:ext cx="2019935" cy="1911848"/>
+            <a:ext cx="2019935" cy="2119112"/>
           </a:xfrm>
           <a:prstGeom prst="rect">
             <a:avLst/>
@@ -21455,7 +21399,11 @@
             </a:r>
             <a:r>
               <a:rPr lang="de-DE" sz="1400" dirty="0" smtClean="0"/>
-              <a:t> Zustand angepasst</a:t>
+              <a:t> Zustand </a:t>
+            </a:r>
+            <a:r>
+              <a:rPr lang="de-DE" sz="1400" dirty="0" smtClean="0"/>
+              <a:t>kann angepasst werden</a:t>
             </a:r>
             <a:endParaRPr lang="de-DE" sz="1400" dirty="0"/>
           </a:p>
@@ -21472,7 +21420,7 @@
         <p:spPr bwMode="auto">
           <a:xfrm>
             <a:off x="7126106" y="4123192"/>
-            <a:ext cx="2019935" cy="1911848"/>
+            <a:ext cx="2019935" cy="2119112"/>
           </a:xfrm>
           <a:prstGeom prst="rect">
             <a:avLst/>
@@ -21627,7 +21575,6 @@
               <a:rPr lang="de-DE" dirty="0"/>
               <a:t>Einstellung auf realistische Werte</a:t>
             </a:r>
-            <a:endParaRPr lang="de-DE" dirty="0"/>
           </a:p>
         </p:txBody>
       </p:sp>
@@ -22379,11 +22326,6 @@
               </a:rPr>
               <a:t>Custom Kalman</a:t>
             </a:r>
-            <a:endParaRPr kumimoji="1" lang="de-DE" sz="1400" dirty="0">
-              <a:latin typeface="Verdana" pitchFamily="34" charset="0"/>
-              <a:ea typeface="ヒラギノ角ゴ Pro W3"/>
-              <a:cs typeface="ヒラギノ角ゴ Pro W3"/>
-            </a:endParaRPr>
           </a:p>
         </p:txBody>
       </p:sp>
@@ -23141,14 +23083,6 @@
               </a:rPr>
               <a:t> ungeeignet</a:t>
             </a:r>
-            <a:endParaRPr kumimoji="1" lang="de-DE" sz="1400" dirty="0">
-              <a:solidFill>
-                <a:schemeClr val="bg1"/>
-              </a:solidFill>
-              <a:latin typeface="Verdana" pitchFamily="34" charset="0"/>
-              <a:ea typeface="ヒラギノ角ゴ Pro W3"/>
-              <a:cs typeface="ヒラギノ角ゴ Pro W3"/>
-            </a:endParaRPr>
           </a:p>
         </p:txBody>
       </p:sp>
@@ -23200,11 +23134,6 @@
               </a:rPr>
               <a:t>Custom Kalman</a:t>
             </a:r>
-            <a:endParaRPr kumimoji="1" lang="de-DE" sz="1400" dirty="0">
-              <a:latin typeface="Verdana" pitchFamily="34" charset="0"/>
-              <a:ea typeface="ヒラギノ角ゴ Pro W3"/>
-              <a:cs typeface="ヒラギノ角ゴ Pro W3"/>
-            </a:endParaRPr>
           </a:p>
         </p:txBody>
       </p:sp>
@@ -24223,14 +24152,6 @@
               </a:rPr>
               <a:t>MCA2 Simulator</a:t>
             </a:r>
-            <a:endParaRPr kumimoji="1" lang="de-DE" sz="1400" dirty="0">
-              <a:solidFill>
-                <a:schemeClr val="bg1"/>
-              </a:solidFill>
-              <a:latin typeface="Verdana" pitchFamily="34" charset="0"/>
-              <a:ea typeface="ヒラギノ角ゴ Pro W3"/>
-              <a:cs typeface="ヒラギノ角ゴ Pro W3"/>
-            </a:endParaRPr>
           </a:p>
         </p:txBody>
       </p:sp>
@@ -24463,11 +24384,6 @@
               </a:rPr>
               <a:t>Custom Kalman</a:t>
             </a:r>
-            <a:endParaRPr kumimoji="1" lang="de-DE" sz="1400" dirty="0">
-              <a:latin typeface="Verdana" pitchFamily="34" charset="0"/>
-              <a:ea typeface="ヒラギノ角ゴ Pro W3"/>
-              <a:cs typeface="ヒラギノ角ゴ Pro W3"/>
-            </a:endParaRPr>
           </a:p>
         </p:txBody>
       </p:sp>

</xml_diff>